<commit_message>
Make some changes to the midterm powerpoint presenation
</commit_message>
<xml_diff>
--- a/Documentation/Presentations/Midterm presentation DS7.pptx
+++ b/Documentation/Presentations/Midterm presentation DS7.pptx
@@ -218,7 +218,7 @@
           <a:p>
             <a:fld id="{DBAE3B3E-782A-9745-8E84-372F7B6771BF}" type="datetimeFigureOut">
               <a:rPr lang="en-US" smtClean="0"/>
-              <a:t>12/14/2019</a:t>
+              <a:t>12/16/19</a:t>
             </a:fld>
             <a:endParaRPr lang="en-US" dirty="0"/>
           </a:p>
@@ -284,7 +284,7 @@
           <a:p>
             <a:fld id="{3C171C0A-6FC9-E54E-92BE-11816E6C8A1A}" type="slidenum">
               <a:rPr lang="en-US" smtClean="0"/>
-              <a:t>‹#›</a:t>
+              <a:t>‹nr.›</a:t>
             </a:fld>
             <a:endParaRPr lang="en-US" dirty="0"/>
           </a:p>
@@ -798,7 +798,7 @@
             <a:fld id="{6557312C-2AB5-4E4E-8F57-D0081D5FE9E6}" type="slidenum">
               <a:rPr lang="en-US" smtClean="0"/>
               <a:pPr/>
-              <a:t>‹#›</a:t>
+              <a:t>‹nr.›</a:t>
             </a:fld>
             <a:endParaRPr lang="en-US" dirty="0"/>
           </a:p>
@@ -958,7 +958,7 @@
           <a:p>
             <a:fld id="{462A2416-1570-3849-86F9-07F78746E1B2}" type="datetimeFigureOut">
               <a:rPr lang="en-US" smtClean="0"/>
-              <a:t>12/14/2019</a:t>
+              <a:t>12/16/19</a:t>
             </a:fld>
             <a:endParaRPr lang="en-US" dirty="0"/>
           </a:p>
@@ -1016,7 +1016,7 @@
           <a:p>
             <a:fld id="{A832CF66-B496-874C-8E08-71A5E0622B6E}" type="slidenum">
               <a:rPr lang="en-US" smtClean="0"/>
-              <a:t>‹#›</a:t>
+              <a:t>‹nr.›</a:t>
             </a:fld>
             <a:endParaRPr lang="en-US" dirty="0"/>
           </a:p>
@@ -1375,7 +1375,7 @@
             <a:fld id="{6557312C-2AB5-4E4E-8F57-D0081D5FE9E6}" type="slidenum">
               <a:rPr lang="en-US" smtClean="0"/>
               <a:pPr/>
-              <a:t>‹#›</a:t>
+              <a:t>‹nr.›</a:t>
             </a:fld>
             <a:endParaRPr lang="en-US" dirty="0"/>
           </a:p>
@@ -1942,7 +1942,7 @@
             <a:fld id="{6557312C-2AB5-4E4E-8F57-D0081D5FE9E6}" type="slidenum">
               <a:rPr lang="en-US" smtClean="0"/>
               <a:pPr/>
-              <a:t>‹#›</a:t>
+              <a:t>‹nr.›</a:t>
             </a:fld>
             <a:endParaRPr lang="en-US" dirty="0"/>
           </a:p>
@@ -2288,12 +2288,37 @@
         </p:spPr>
         <p:txBody>
           <a:bodyPr>
-            <a:normAutofit/>
+            <a:noAutofit/>
           </a:bodyPr>
           <a:lstStyle/>
           <a:p>
             <a:pPr algn="l"/>
-            <a:endParaRPr lang="en-US" sz="8800" dirty="0">
+            <a:r>
+              <a:rPr lang="en-US" sz="6000" dirty="0" err="1">
+                <a:latin typeface="Arial"/>
+                <a:cs typeface="Arial"/>
+              </a:rPr>
+              <a:t>Strava</a:t>
+            </a:r>
+            <a:r>
+              <a:rPr lang="en-US" sz="6000" dirty="0">
+                <a:latin typeface="Arial"/>
+                <a:cs typeface="Arial"/>
+              </a:rPr>
+              <a:t> &amp; </a:t>
+            </a:r>
+            <a:r>
+              <a:rPr lang="en-US" sz="6000" dirty="0"/>
+              <a:t>weather: </a:t>
+            </a:r>
+            <a:br>
+              <a:rPr lang="en-US" sz="5000" dirty="0"/>
+            </a:br>
+            <a:r>
+              <a:rPr lang="en-US" sz="5000" dirty="0"/>
+              <a:t>is there a correlation?</a:t>
+            </a:r>
+            <a:endParaRPr lang="en-US" sz="5000" dirty="0">
               <a:latin typeface="Arial"/>
               <a:cs typeface="Arial"/>
             </a:endParaRPr>
@@ -2317,7 +2342,9 @@
           </a:xfrm>
         </p:spPr>
         <p:txBody>
-          <a:bodyPr/>
+          <a:bodyPr>
+            <a:normAutofit fontScale="92500"/>
+          </a:bodyPr>
           <a:lstStyle/>
           <a:p>
             <a:pPr algn="l"/>
@@ -2327,6 +2354,16 @@
                 <a:cs typeface="Arial"/>
               </a:rPr>
               <a:t>DS Group 7</a:t>
+            </a:r>
+          </a:p>
+          <a:p>
+            <a:pPr algn="l"/>
+            <a:r>
+              <a:rPr lang="en-US" dirty="0">
+                <a:latin typeface="Arial"/>
+                <a:cs typeface="Arial"/>
+              </a:rPr>
+              <a:t>Pieter, Luigi, Julius, Jasper &amp; Ingmar</a:t>
             </a:r>
           </a:p>
         </p:txBody>
@@ -2523,6 +2560,36 @@
           </a:p>
         </p:txBody>
       </p:sp>
+      <p:pic>
+        <p:nvPicPr>
+          <p:cNvPr id="4" name="Afbeelding 3">
+            <a:extLst>
+              <a:ext uri="{FF2B5EF4-FFF2-40B4-BE49-F238E27FC236}">
+                <a16:creationId xmlns:a16="http://schemas.microsoft.com/office/drawing/2014/main" id="{470DF066-E387-6148-97EA-4944FC0F61D6}"/>
+              </a:ext>
+            </a:extLst>
+          </p:cNvPr>
+          <p:cNvPicPr>
+            <a:picLocks noChangeAspect="1"/>
+          </p:cNvPicPr>
+          <p:nvPr/>
+        </p:nvPicPr>
+        <p:blipFill>
+          <a:blip r:embed="rId2"/>
+          <a:stretch>
+            <a:fillRect/>
+          </a:stretch>
+        </p:blipFill>
+        <p:spPr>
+          <a:xfrm>
+            <a:off x="5996064" y="539330"/>
+            <a:ext cx="2361247" cy="2403881"/>
+          </a:xfrm>
+          <a:prstGeom prst="rect">
+            <a:avLst/>
+          </a:prstGeom>
+        </p:spPr>
+      </p:pic>
     </p:spTree>
     <p:extLst>
       <p:ext uri="{BB962C8B-B14F-4D97-AF65-F5344CB8AC3E}">
@@ -2553,6 +2620,36 @@
           <a:chExt cx="0" cy="0"/>
         </a:xfrm>
       </p:grpSpPr>
+      <p:pic>
+        <p:nvPicPr>
+          <p:cNvPr id="5" name="Afbeelding 4">
+            <a:extLst>
+              <a:ext uri="{FF2B5EF4-FFF2-40B4-BE49-F238E27FC236}">
+                <a16:creationId xmlns:a16="http://schemas.microsoft.com/office/drawing/2014/main" id="{55EBD4FA-BBF6-5C4C-A36E-90E15AFF8B1A}"/>
+              </a:ext>
+            </a:extLst>
+          </p:cNvPr>
+          <p:cNvPicPr>
+            <a:picLocks noChangeAspect="1"/>
+          </p:cNvPicPr>
+          <p:nvPr/>
+        </p:nvPicPr>
+        <p:blipFill>
+          <a:blip r:embed="rId2"/>
+          <a:stretch>
+            <a:fillRect/>
+          </a:stretch>
+        </p:blipFill>
+        <p:spPr>
+          <a:xfrm>
+            <a:off x="5515758" y="1063229"/>
+            <a:ext cx="3005942" cy="3206338"/>
+          </a:xfrm>
+          <a:prstGeom prst="rect">
+            <a:avLst/>
+          </a:prstGeom>
+        </p:spPr>
+      </p:pic>
       <p:sp>
         <p:nvSpPr>
           <p:cNvPr id="2" name="Title 1">
@@ -2602,7 +2699,12 @@
             <p:ph idx="1"/>
           </p:nvPr>
         </p:nvSpPr>
-        <p:spPr/>
+        <p:spPr>
+          <a:xfrm>
+            <a:off x="1763106" y="1200150"/>
+            <a:ext cx="4434494" cy="3486122"/>
+          </a:xfrm>
+        </p:spPr>
         <p:txBody>
           <a:bodyPr/>
           <a:lstStyle/>
@@ -2926,7 +3028,140 @@
           <a:bodyPr/>
           <a:lstStyle/>
           <a:p>
-            <a:endParaRPr lang="nl-NL"/>
+            <a:r>
+              <a:rPr lang="nl-NL" dirty="0"/>
+              <a:t>KNMI is </a:t>
+            </a:r>
+            <a:r>
+              <a:rPr lang="nl-NL" dirty="0" err="1"/>
+              <a:t>limited</a:t>
+            </a:r>
+            <a:r>
+              <a:rPr lang="nl-NL" dirty="0"/>
+              <a:t> </a:t>
+            </a:r>
+            <a:r>
+              <a:rPr lang="nl-NL" dirty="0" err="1"/>
+              <a:t>to</a:t>
+            </a:r>
+            <a:r>
+              <a:rPr lang="nl-NL" dirty="0"/>
+              <a:t> </a:t>
+            </a:r>
+            <a:r>
+              <a:rPr lang="nl-NL" dirty="0" err="1"/>
+              <a:t>the</a:t>
+            </a:r>
+            <a:r>
+              <a:rPr lang="nl-NL" dirty="0"/>
+              <a:t> Netherlands</a:t>
+            </a:r>
+          </a:p>
+          <a:p>
+            <a:r>
+              <a:rPr lang="nl-NL" dirty="0" err="1"/>
+              <a:t>Not</a:t>
+            </a:r>
+            <a:r>
+              <a:rPr lang="nl-NL" dirty="0"/>
+              <a:t> </a:t>
+            </a:r>
+            <a:r>
+              <a:rPr lang="nl-NL" dirty="0" err="1"/>
+              <a:t>all</a:t>
+            </a:r>
+            <a:r>
+              <a:rPr lang="nl-NL" dirty="0"/>
+              <a:t> </a:t>
+            </a:r>
+            <a:r>
+              <a:rPr lang="nl-NL" dirty="0" err="1"/>
+              <a:t>cyclists</a:t>
+            </a:r>
+            <a:r>
+              <a:rPr lang="nl-NL" dirty="0"/>
+              <a:t> </a:t>
+            </a:r>
+            <a:r>
+              <a:rPr lang="nl-NL" dirty="0" err="1"/>
+              <a:t>use</a:t>
+            </a:r>
+            <a:r>
+              <a:rPr lang="nl-NL" dirty="0"/>
+              <a:t> </a:t>
+            </a:r>
+            <a:r>
+              <a:rPr lang="nl-NL" dirty="0" err="1"/>
+              <a:t>Strava</a:t>
+            </a:r>
+            <a:endParaRPr lang="nl-NL" dirty="0"/>
+          </a:p>
+          <a:p>
+            <a:r>
+              <a:rPr lang="nl-NL" dirty="0" err="1"/>
+              <a:t>Strava’s</a:t>
+            </a:r>
+            <a:r>
+              <a:rPr lang="nl-NL" dirty="0"/>
+              <a:t> </a:t>
+            </a:r>
+            <a:r>
+              <a:rPr lang="nl-NL" dirty="0" err="1"/>
+              <a:t>popularity</a:t>
+            </a:r>
+            <a:r>
+              <a:rPr lang="nl-NL" dirty="0"/>
+              <a:t> over time</a:t>
+            </a:r>
+          </a:p>
+          <a:p>
+            <a:r>
+              <a:rPr lang="nl-NL" dirty="0" err="1"/>
+              <a:t>Defining</a:t>
+            </a:r>
+            <a:r>
+              <a:rPr lang="nl-NL" dirty="0"/>
+              <a:t> a </a:t>
+            </a:r>
+            <a:r>
+              <a:rPr lang="nl-NL" dirty="0" err="1"/>
+              <a:t>good</a:t>
+            </a:r>
+            <a:r>
+              <a:rPr lang="nl-NL" dirty="0"/>
+              <a:t> </a:t>
+            </a:r>
+            <a:r>
+              <a:rPr lang="nl-NL" dirty="0" err="1"/>
+              <a:t>weather</a:t>
+            </a:r>
+            <a:r>
+              <a:rPr lang="nl-NL" dirty="0"/>
+              <a:t> scoring is </a:t>
+            </a:r>
+            <a:r>
+              <a:rPr lang="nl-NL" dirty="0" err="1"/>
+              <a:t>difficult</a:t>
+            </a:r>
+            <a:endParaRPr lang="nl-NL" dirty="0"/>
+          </a:p>
+          <a:p>
+            <a:r>
+              <a:rPr lang="nl-NL" dirty="0" err="1"/>
+              <a:t>Amount</a:t>
+            </a:r>
+            <a:r>
+              <a:rPr lang="nl-NL" dirty="0"/>
+              <a:t> of </a:t>
+            </a:r>
+            <a:r>
+              <a:rPr lang="nl-NL" dirty="0" err="1"/>
+              <a:t>requests</a:t>
+            </a:r>
+            <a:endParaRPr lang="nl-NL" dirty="0"/>
+          </a:p>
+          <a:p>
+            <a:endParaRPr lang="nl-NL" dirty="0"/>
           </a:p>
         </p:txBody>
       </p:sp>
@@ -4012,7 +4247,14 @@
           <a:p>
             <a:r>
               <a:rPr lang="en-US" dirty="0"/>
-              <a:t>Weather data: ?</a:t>
+              <a:t>Weather module:</a:t>
+            </a:r>
+          </a:p>
+          <a:p>
+            <a:pPr lvl="1"/>
+            <a:r>
+              <a:rPr lang="en-US" dirty="0"/>
+              <a:t>Works, weather scoring needs some refinement</a:t>
             </a:r>
           </a:p>
           <a:p>
@@ -4022,7 +4264,14 @@
             </a:r>
             <a:r>
               <a:rPr lang="en-US" dirty="0"/>
-              <a:t>: too many requests</a:t>
+              <a:t> module: </a:t>
+            </a:r>
+          </a:p>
+          <a:p>
+            <a:pPr lvl="1"/>
+            <a:r>
+              <a:rPr lang="en-US" dirty="0"/>
+              <a:t>Too many requests</a:t>
             </a:r>
           </a:p>
           <a:p>
@@ -4032,11 +4281,14 @@
             </a:r>
             <a:r>
               <a:rPr lang="nl-NL" dirty="0"/>
-              <a:t> module </a:t>
-            </a:r>
+              <a:t> module:</a:t>
+            </a:r>
+          </a:p>
+          <a:p>
+            <a:pPr lvl="1"/>
             <a:r>
               <a:rPr lang="nl-NL" dirty="0" err="1"/>
-              <a:t>finished</a:t>
+              <a:t>Finished</a:t>
             </a:r>
             <a:endParaRPr lang="nl-NL" dirty="0"/>
           </a:p>

</xml_diff>

<commit_message>
Add slides for demos
</commit_message>
<xml_diff>
--- a/Documentation/Presentations/Midterm presentation DS7.pptx
+++ b/Documentation/Presentations/Midterm presentation DS7.pptx
@@ -6,7 +6,7 @@
     <p:sldMasterId id="2147483660" r:id="rId2"/>
   </p:sldMasterIdLst>
   <p:handoutMasterIdLst>
-    <p:handoutMasterId r:id="rId13"/>
+    <p:handoutMasterId r:id="rId16"/>
   </p:handoutMasterIdLst>
   <p:sldIdLst>
     <p:sldId id="256" r:id="rId3"/>
@@ -17,8 +17,11 @@
     <p:sldId id="267" r:id="rId8"/>
     <p:sldId id="271" r:id="rId9"/>
     <p:sldId id="272" r:id="rId10"/>
-    <p:sldId id="273" r:id="rId11"/>
-    <p:sldId id="274" r:id="rId12"/>
+    <p:sldId id="275" r:id="rId11"/>
+    <p:sldId id="276" r:id="rId12"/>
+    <p:sldId id="277" r:id="rId13"/>
+    <p:sldId id="273" r:id="rId14"/>
+    <p:sldId id="274" r:id="rId15"/>
   </p:sldIdLst>
   <p:sldSz cx="9144000" cy="5143500" type="screen16x9"/>
   <p:notesSz cx="6858000" cy="9144000"/>
@@ -218,7 +221,7 @@
           <a:p>
             <a:fld id="{DBAE3B3E-782A-9745-8E84-372F7B6771BF}" type="datetimeFigureOut">
               <a:rPr lang="en-US" smtClean="0"/>
-              <a:t>12/16/19</a:t>
+              <a:t>12/17/19</a:t>
             </a:fld>
             <a:endParaRPr lang="en-US" dirty="0"/>
           </a:p>
@@ -958,7 +961,7 @@
           <a:p>
             <a:fld id="{462A2416-1570-3849-86F9-07F78746E1B2}" type="datetimeFigureOut">
               <a:rPr lang="en-US" smtClean="0"/>
-              <a:t>12/16/19</a:t>
+              <a:t>12/17/19</a:t>
             </a:fld>
             <a:endParaRPr lang="en-US" dirty="0"/>
           </a:p>
@@ -2382,6 +2385,317 @@
 </file>
 
 <file path=ppt/slides/slide10.xml><?xml version="1.0" encoding="utf-8"?>
+<p:sld xmlns:a="http://schemas.openxmlformats.org/drawingml/2006/main" xmlns:r="http://schemas.openxmlformats.org/officeDocument/2006/relationships" xmlns:p="http://schemas.openxmlformats.org/presentationml/2006/main">
+  <p:cSld>
+    <p:spTree>
+      <p:nvGrpSpPr>
+        <p:cNvPr id="1" name=""/>
+        <p:cNvGrpSpPr/>
+        <p:nvPr/>
+      </p:nvGrpSpPr>
+      <p:grpSpPr>
+        <a:xfrm>
+          <a:off x="0" y="0"/>
+          <a:ext cx="0" cy="0"/>
+          <a:chOff x="0" y="0"/>
+          <a:chExt cx="0" cy="0"/>
+        </a:xfrm>
+      </p:grpSpPr>
+      <p:sp>
+        <p:nvSpPr>
+          <p:cNvPr id="2" name="Titel 1">
+            <a:extLst>
+              <a:ext uri="{FF2B5EF4-FFF2-40B4-BE49-F238E27FC236}">
+                <a16:creationId xmlns:a16="http://schemas.microsoft.com/office/drawing/2014/main" id="{7C01874A-6CE3-AB42-A65F-018E0C3D998E}"/>
+              </a:ext>
+            </a:extLst>
+          </p:cNvPr>
+          <p:cNvSpPr>
+            <a:spLocks noGrp="1"/>
+          </p:cNvSpPr>
+          <p:nvPr>
+            <p:ph type="title"/>
+          </p:nvPr>
+        </p:nvSpPr>
+        <p:spPr/>
+        <p:txBody>
+          <a:bodyPr/>
+          <a:lstStyle/>
+          <a:p>
+            <a:r>
+              <a:rPr lang="nl-NL" dirty="0"/>
+              <a:t>Demo: </a:t>
+            </a:r>
+            <a:r>
+              <a:rPr lang="nl-NL" dirty="0" err="1"/>
+              <a:t>Visualization</a:t>
+            </a:r>
+            <a:r>
+              <a:rPr lang="nl-NL" dirty="0"/>
+              <a:t> Module</a:t>
+            </a:r>
+          </a:p>
+        </p:txBody>
+      </p:sp>
+      <p:sp>
+        <p:nvSpPr>
+          <p:cNvPr id="3" name="Tijdelijke aanduiding voor inhoud 2">
+            <a:extLst>
+              <a:ext uri="{FF2B5EF4-FFF2-40B4-BE49-F238E27FC236}">
+                <a16:creationId xmlns:a16="http://schemas.microsoft.com/office/drawing/2014/main" id="{0EBF9D5A-C86A-D54A-98E5-FE1B05FAEA3A}"/>
+              </a:ext>
+            </a:extLst>
+          </p:cNvPr>
+          <p:cNvSpPr>
+            <a:spLocks noGrp="1"/>
+          </p:cNvSpPr>
+          <p:nvPr>
+            <p:ph idx="1"/>
+          </p:nvPr>
+        </p:nvSpPr>
+        <p:spPr/>
+        <p:txBody>
+          <a:bodyPr/>
+          <a:lstStyle/>
+          <a:p>
+            <a:endParaRPr lang="nl-NL"/>
+          </a:p>
+        </p:txBody>
+      </p:sp>
+    </p:spTree>
+    <p:extLst>
+      <p:ext uri="{BB962C8B-B14F-4D97-AF65-F5344CB8AC3E}">
+        <p14:creationId xmlns:p14="http://schemas.microsoft.com/office/powerpoint/2010/main" val="1971568347"/>
+      </p:ext>
+    </p:extLst>
+  </p:cSld>
+  <p:clrMapOvr>
+    <a:masterClrMapping/>
+  </p:clrMapOvr>
+</p:sld>
+</file>
+
+<file path=ppt/slides/slide11.xml><?xml version="1.0" encoding="utf-8"?>
+<p:sld xmlns:a="http://schemas.openxmlformats.org/drawingml/2006/main" xmlns:r="http://schemas.openxmlformats.org/officeDocument/2006/relationships" xmlns:p="http://schemas.openxmlformats.org/presentationml/2006/main">
+  <p:cSld>
+    <p:spTree>
+      <p:nvGrpSpPr>
+        <p:cNvPr id="1" name=""/>
+        <p:cNvGrpSpPr/>
+        <p:nvPr/>
+      </p:nvGrpSpPr>
+      <p:grpSpPr>
+        <a:xfrm>
+          <a:off x="0" y="0"/>
+          <a:ext cx="0" cy="0"/>
+          <a:chOff x="0" y="0"/>
+          <a:chExt cx="0" cy="0"/>
+        </a:xfrm>
+      </p:grpSpPr>
+      <p:sp>
+        <p:nvSpPr>
+          <p:cNvPr id="2" name="Titel 1">
+            <a:extLst>
+              <a:ext uri="{FF2B5EF4-FFF2-40B4-BE49-F238E27FC236}">
+                <a16:creationId xmlns:a16="http://schemas.microsoft.com/office/drawing/2014/main" id="{3D2B5BA6-E81F-3643-9AA4-28D9518A91D5}"/>
+              </a:ext>
+            </a:extLst>
+          </p:cNvPr>
+          <p:cNvSpPr>
+            <a:spLocks noGrp="1"/>
+          </p:cNvSpPr>
+          <p:nvPr>
+            <p:ph type="title"/>
+          </p:nvPr>
+        </p:nvSpPr>
+        <p:spPr/>
+        <p:txBody>
+          <a:bodyPr/>
+          <a:lstStyle/>
+          <a:p>
+            <a:r>
+              <a:rPr lang="nl-NL" dirty="0"/>
+              <a:t>Demo: </a:t>
+            </a:r>
+            <a:r>
+              <a:rPr lang="nl-NL" dirty="0" err="1"/>
+              <a:t>Weather</a:t>
+            </a:r>
+            <a:r>
+              <a:rPr lang="nl-NL" dirty="0"/>
+              <a:t> Module</a:t>
+            </a:r>
+          </a:p>
+        </p:txBody>
+      </p:sp>
+      <p:sp>
+        <p:nvSpPr>
+          <p:cNvPr id="3" name="Tijdelijke aanduiding voor inhoud 2">
+            <a:extLst>
+              <a:ext uri="{FF2B5EF4-FFF2-40B4-BE49-F238E27FC236}">
+                <a16:creationId xmlns:a16="http://schemas.microsoft.com/office/drawing/2014/main" id="{C4EDB0A6-89B9-1443-A3FC-EEBCA5A8B79D}"/>
+              </a:ext>
+            </a:extLst>
+          </p:cNvPr>
+          <p:cNvSpPr>
+            <a:spLocks noGrp="1"/>
+          </p:cNvSpPr>
+          <p:nvPr>
+            <p:ph idx="1"/>
+          </p:nvPr>
+        </p:nvSpPr>
+        <p:spPr/>
+        <p:txBody>
+          <a:bodyPr/>
+          <a:lstStyle/>
+          <a:p>
+            <a:endParaRPr lang="nl-NL"/>
+          </a:p>
+        </p:txBody>
+      </p:sp>
+    </p:spTree>
+    <p:extLst>
+      <p:ext uri="{BB962C8B-B14F-4D97-AF65-F5344CB8AC3E}">
+        <p14:creationId xmlns:p14="http://schemas.microsoft.com/office/powerpoint/2010/main" val="1610747817"/>
+      </p:ext>
+    </p:extLst>
+  </p:cSld>
+  <p:clrMapOvr>
+    <a:masterClrMapping/>
+  </p:clrMapOvr>
+</p:sld>
+</file>
+
+<file path=ppt/slides/slide12.xml><?xml version="1.0" encoding="utf-8"?>
+<p:sld xmlns:a="http://schemas.openxmlformats.org/drawingml/2006/main" xmlns:r="http://schemas.openxmlformats.org/officeDocument/2006/relationships" xmlns:p="http://schemas.openxmlformats.org/presentationml/2006/main">
+  <p:cSld>
+    <p:spTree>
+      <p:nvGrpSpPr>
+        <p:cNvPr id="1" name=""/>
+        <p:cNvGrpSpPr/>
+        <p:nvPr/>
+      </p:nvGrpSpPr>
+      <p:grpSpPr>
+        <a:xfrm>
+          <a:off x="0" y="0"/>
+          <a:ext cx="0" cy="0"/>
+          <a:chOff x="0" y="0"/>
+          <a:chExt cx="0" cy="0"/>
+        </a:xfrm>
+      </p:grpSpPr>
+      <p:sp>
+        <p:nvSpPr>
+          <p:cNvPr id="2" name="Title 1">
+            <a:extLst>
+              <a:ext uri="{FF2B5EF4-FFF2-40B4-BE49-F238E27FC236}">
+                <a16:creationId xmlns:a16="http://schemas.microsoft.com/office/drawing/2014/main" id="{E7BA9EDF-9C88-41A8-8588-6B235ACC0A09}"/>
+              </a:ext>
+            </a:extLst>
+          </p:cNvPr>
+          <p:cNvSpPr>
+            <a:spLocks noGrp="1"/>
+          </p:cNvSpPr>
+          <p:nvPr>
+            <p:ph type="title"/>
+          </p:nvPr>
+        </p:nvSpPr>
+        <p:spPr/>
+        <p:txBody>
+          <a:bodyPr/>
+          <a:lstStyle/>
+          <a:p>
+            <a:r>
+              <a:rPr lang="en-US" dirty="0"/>
+              <a:t>Implementation update</a:t>
+            </a:r>
+            <a:endParaRPr lang="nl-NL" dirty="0"/>
+          </a:p>
+        </p:txBody>
+      </p:sp>
+      <p:sp>
+        <p:nvSpPr>
+          <p:cNvPr id="3" name="Content Placeholder 2">
+            <a:extLst>
+              <a:ext uri="{FF2B5EF4-FFF2-40B4-BE49-F238E27FC236}">
+                <a16:creationId xmlns:a16="http://schemas.microsoft.com/office/drawing/2014/main" id="{A33E82D3-A681-4EA6-99EA-0322764F8CA8}"/>
+              </a:ext>
+            </a:extLst>
+          </p:cNvPr>
+          <p:cNvSpPr>
+            <a:spLocks noGrp="1"/>
+          </p:cNvSpPr>
+          <p:nvPr>
+            <p:ph idx="1"/>
+          </p:nvPr>
+        </p:nvSpPr>
+        <p:spPr/>
+        <p:txBody>
+          <a:bodyPr/>
+          <a:lstStyle/>
+          <a:p>
+            <a:r>
+              <a:rPr lang="en-US" dirty="0"/>
+              <a:t>Weather module:</a:t>
+            </a:r>
+          </a:p>
+          <a:p>
+            <a:pPr lvl="1"/>
+            <a:r>
+              <a:rPr lang="en-US" dirty="0"/>
+              <a:t>Works, weather scoring needs some refinement</a:t>
+            </a:r>
+          </a:p>
+          <a:p>
+            <a:r>
+              <a:rPr lang="en-US" dirty="0" err="1"/>
+              <a:t>Strava</a:t>
+            </a:r>
+            <a:r>
+              <a:rPr lang="en-US" dirty="0"/>
+              <a:t> module: </a:t>
+            </a:r>
+          </a:p>
+          <a:p>
+            <a:pPr lvl="1"/>
+            <a:r>
+              <a:rPr lang="en-US" dirty="0"/>
+              <a:t>Too many requests</a:t>
+            </a:r>
+          </a:p>
+          <a:p>
+            <a:r>
+              <a:rPr lang="nl-NL" dirty="0" err="1"/>
+              <a:t>Visualization</a:t>
+            </a:r>
+            <a:r>
+              <a:rPr lang="nl-NL" dirty="0"/>
+              <a:t> module:</a:t>
+            </a:r>
+          </a:p>
+          <a:p>
+            <a:pPr lvl="1"/>
+            <a:r>
+              <a:rPr lang="nl-NL" dirty="0" err="1"/>
+              <a:t>Finished</a:t>
+            </a:r>
+            <a:endParaRPr lang="nl-NL" dirty="0"/>
+          </a:p>
+        </p:txBody>
+      </p:sp>
+    </p:spTree>
+    <p:extLst>
+      <p:ext uri="{BB962C8B-B14F-4D97-AF65-F5344CB8AC3E}">
+        <p14:creationId xmlns:p14="http://schemas.microsoft.com/office/powerpoint/2010/main" val="2826956327"/>
+      </p:ext>
+    </p:extLst>
+  </p:cSld>
+  <p:clrMapOvr>
+    <a:masterClrMapping/>
+  </p:clrMapOvr>
+</p:sld>
+</file>
+
+<file path=ppt/slides/slide13.xml><?xml version="1.0" encoding="utf-8"?>
 <p:sld xmlns:a="http://schemas.openxmlformats.org/drawingml/2006/main" xmlns:r="http://schemas.openxmlformats.org/officeDocument/2006/relationships" xmlns:p="http://schemas.openxmlformats.org/presentationml/2006/main">
   <p:cSld>
     <p:spTree>
@@ -4197,10 +4511,10 @@
       </p:grpSpPr>
       <p:sp>
         <p:nvSpPr>
-          <p:cNvPr id="2" name="Title 1">
+          <p:cNvPr id="2" name="Titel 1">
             <a:extLst>
               <a:ext uri="{FF2B5EF4-FFF2-40B4-BE49-F238E27FC236}">
-                <a16:creationId xmlns:a16="http://schemas.microsoft.com/office/drawing/2014/main" id="{E7BA9EDF-9C88-41A8-8588-6B235ACC0A09}"/>
+                <a16:creationId xmlns:a16="http://schemas.microsoft.com/office/drawing/2014/main" id="{B4573BD7-ED76-6640-B7A4-7A6684D724D2}"/>
               </a:ext>
             </a:extLst>
           </p:cNvPr>
@@ -4217,19 +4531,26 @@
           <a:lstStyle/>
           <a:p>
             <a:r>
-              <a:rPr lang="en-US" dirty="0"/>
-              <a:t>Implementation update</a:t>
-            </a:r>
-            <a:endParaRPr lang="nl-NL" dirty="0"/>
+              <a:rPr lang="nl-NL" dirty="0"/>
+              <a:t>Demo: </a:t>
+            </a:r>
+            <a:r>
+              <a:rPr lang="nl-NL" dirty="0" err="1"/>
+              <a:t>Strava</a:t>
+            </a:r>
+            <a:r>
+              <a:rPr lang="nl-NL" dirty="0"/>
+              <a:t> Module</a:t>
+            </a:r>
           </a:p>
         </p:txBody>
       </p:sp>
       <p:sp>
         <p:nvSpPr>
-          <p:cNvPr id="3" name="Content Placeholder 2">
+          <p:cNvPr id="3" name="Tijdelijke aanduiding voor inhoud 2">
             <a:extLst>
               <a:ext uri="{FF2B5EF4-FFF2-40B4-BE49-F238E27FC236}">
-                <a16:creationId xmlns:a16="http://schemas.microsoft.com/office/drawing/2014/main" id="{A33E82D3-A681-4EA6-99EA-0322764F8CA8}"/>
+                <a16:creationId xmlns:a16="http://schemas.microsoft.com/office/drawing/2014/main" id="{B177BB80-04B0-1241-BB1F-06DAF1547E1D}"/>
               </a:ext>
             </a:extLst>
           </p:cNvPr>
@@ -4245,59 +4566,14 @@
           <a:bodyPr/>
           <a:lstStyle/>
           <a:p>
-            <a:r>
-              <a:rPr lang="en-US" dirty="0"/>
-              <a:t>Weather module:</a:t>
-            </a:r>
-          </a:p>
-          <a:p>
-            <a:pPr lvl="1"/>
-            <a:r>
-              <a:rPr lang="en-US" dirty="0"/>
-              <a:t>Works, weather scoring needs some refinement</a:t>
-            </a:r>
-          </a:p>
-          <a:p>
-            <a:r>
-              <a:rPr lang="en-US" dirty="0" err="1"/>
-              <a:t>Strava</a:t>
-            </a:r>
-            <a:r>
-              <a:rPr lang="en-US" dirty="0"/>
-              <a:t> module: </a:t>
-            </a:r>
-          </a:p>
-          <a:p>
-            <a:pPr lvl="1"/>
-            <a:r>
-              <a:rPr lang="en-US" dirty="0"/>
-              <a:t>Too many requests</a:t>
-            </a:r>
-          </a:p>
-          <a:p>
-            <a:r>
-              <a:rPr lang="nl-NL" dirty="0" err="1"/>
-              <a:t>Visualization</a:t>
-            </a:r>
-            <a:r>
-              <a:rPr lang="nl-NL" dirty="0"/>
-              <a:t> module:</a:t>
-            </a:r>
-          </a:p>
-          <a:p>
-            <a:pPr lvl="1"/>
-            <a:r>
-              <a:rPr lang="nl-NL" dirty="0" err="1"/>
-              <a:t>Finished</a:t>
-            </a:r>
-            <a:endParaRPr lang="nl-NL" dirty="0"/>
+            <a:endParaRPr lang="nl-NL"/>
           </a:p>
         </p:txBody>
       </p:sp>
     </p:spTree>
     <p:extLst>
       <p:ext uri="{BB962C8B-B14F-4D97-AF65-F5344CB8AC3E}">
-        <p14:creationId xmlns:p14="http://schemas.microsoft.com/office/powerpoint/2010/main" val="2826956327"/>
+        <p14:creationId xmlns:p14="http://schemas.microsoft.com/office/powerpoint/2010/main" val="2151064812"/>
       </p:ext>
     </p:extLst>
   </p:cSld>

</xml_diff>